<commit_message>
Update slides half page
</commit_message>
<xml_diff>
--- a/UI/template_barclays.pptx
+++ b/UI/template_barclays.pptx
@@ -297,7 +297,7 @@
           <a:p>
             <a:fld id="{B9D56017-E1D6-4328-847C-279FDFBEEB3E}" type="datetime8">
               <a:rPr lang="en-US" smtClean="0"/>
-              <a:t>11/10/24 10:46 PM</a:t>
+              <a:t>11/13/24 5:17 PM</a:t>
             </a:fld>
             <a:endParaRPr lang="en-US" dirty="0"/>
           </a:p>
@@ -560,7 +560,7 @@
           <a:p>
             <a:fld id="{F331429C-E2E7-497C-8E54-24F95E5329D6}" type="datetime8">
               <a:rPr lang="en-US" smtClean="0"/>
-              <a:t>11/10/24 10:46 PM</a:t>
+              <a:t>11/13/24 5:17 PM</a:t>
             </a:fld>
             <a:endParaRPr lang="en-US" dirty="0"/>
           </a:p>
@@ -5291,7 +5291,7 @@
         <p:spPr>
           <a:xfrm>
             <a:off x="687600" y="1314000"/>
-            <a:ext cx="8686800" cy="5734500"/>
+            <a:ext cx="4341600" cy="5734500"/>
           </a:xfrm>
           <a:prstGeom prst="rect">
             <a:avLst/>
@@ -5318,7 +5318,7 @@
           <a:p>
             <a:pPr lvl="0"/>
             <a:r>
-              <a:rPr lang="en-US"/>
+              <a:rPr lang="en-US" dirty="0"/>
               <a:t>Click to edit Master text styles</a:t>
             </a:r>
           </a:p>
@@ -5484,7 +5484,7 @@
           <a:p>
             <a:fld id="{E3024F71-7991-49A2-8312-E541ED66C5D0}" type="datetimeFigureOut">
               <a:rPr lang="en-US" smtClean="0"/>
-              <a:t>11/10/24</a:t>
+              <a:t>11/13/24</a:t>
             </a:fld>
             <a:endParaRPr lang="en-US"/>
           </a:p>
@@ -46215,6 +46215,33 @@
 </file>
 
 <file path=customXml/item1.xml><?xml version="1.0" encoding="utf-8"?>
+<p:properties xmlns:p="http://schemas.microsoft.com/office/2006/metadata/properties" xmlns:xsi="http://www.w3.org/2001/XMLSchema-instance" xmlns:pc="http://schemas.microsoft.com/office/infopath/2007/PartnerControls">
+  <documentManagement>
+    <Layouts xmlns="f20084d7-61e8-404e-beff-acc10ebb1c4c">C7,C5,C6,A2,T1,S1,S2,S3,S6,S7,C4,A3,S8,C8,C9,C10,C11,S9,S10,S11,S12</Layouts>
+    <Region xmlns="f20084d7-61e8-404e-beff-acc10ebb1c4c" xsi:nil="true"/>
+    <Key xmlns="f20084d7-61e8-404e-beff-acc10ebb1c4c">NEWPBCAPL</Key>
+    <TemplateSize xmlns="f20084d7-61e8-404e-beff-acc10ebb1c4c">Letter</TemplateSize>
+    <ItemsOrder xmlns="f20084d7-61e8-404e-beff-acc10ebb1c4c">10</ItemsOrder>
+    <Caption xmlns="f20084d7-61e8-404e-beff-acc10ebb1c4c">New PresBuilder Letter</Caption>
+    <Category xmlns="f20084d7-61e8-404e-beff-acc10ebb1c4c">Investment Banking</Category>
+    <TaxCatchAll xmlns="cdf71830-c9e3-49d3-97db-b43ec28a30d4" xsi:nil="true"/>
+    <lcf76f155ced4ddcb4097134ff3c332f xmlns="f20084d7-61e8-404e-beff-acc10ebb1c4c">
+      <Terms xmlns="http://schemas.microsoft.com/office/infopath/2007/PartnerControls"/>
+    </lcf76f155ced4ddcb4097134ff3c332f>
+  </documentManagement>
+</p:properties>
+</file>
+
+<file path=customXml/item2.xml><?xml version="1.0" encoding="utf-8"?>
+<?mso-contentType ?>
+<FormTemplates xmlns="http://schemas.microsoft.com/sharepoint/v3/contenttype/forms">
+  <Display>DocumentLibraryForm</Display>
+  <Edit>DocumentLibraryForm</Edit>
+  <New>DocumentLibraryForm</New>
+</FormTemplates>
+</file>
+
+<file path=customXml/item3.xml><?xml version="1.0" encoding="utf-8"?>
 <ct:contentTypeSchema xmlns:ct="http://schemas.microsoft.com/office/2006/metadata/contentType" xmlns:ma="http://schemas.microsoft.com/office/2006/metadata/properties/metaAttributes" ct:_="" ma:_="" ma:contentTypeName="Document" ma:contentTypeID="0x010100539C862B2B5C774DAF152931BC5193B2" ma:contentTypeVersion="21" ma:contentTypeDescription="Create a new document." ma:contentTypeScope="" ma:versionID="2bf54d7c94c809b9654e6d8a0dd48bb3">
   <xsd:schema xmlns:xsd="http://www.w3.org/2001/XMLSchema" xmlns:xs="http://www.w3.org/2001/XMLSchema" xmlns:p="http://schemas.microsoft.com/office/2006/metadata/properties" xmlns:ns2="f20084d7-61e8-404e-beff-acc10ebb1c4c" xmlns:ns3="fd6fbb7f-0d31-47a8-8a19-38b5c1e6bff0" xmlns:ns4="cdf71830-c9e3-49d3-97db-b43ec28a30d4" targetNamespace="http://schemas.microsoft.com/office/2006/metadata/properties" ma:root="true" ma:fieldsID="e6faf85e5254d7c9d07cc17b7239a519" ns2:_="" ns3:_="" ns4:_="">
     <xsd:import namespace="f20084d7-61e8-404e-beff-acc10ebb1c4c"/>
@@ -46532,34 +46559,33 @@
 </ct:contentTypeSchema>
 </file>
 
-<file path=customXml/item2.xml><?xml version="1.0" encoding="utf-8"?>
-<p:properties xmlns:p="http://schemas.microsoft.com/office/2006/metadata/properties" xmlns:xsi="http://www.w3.org/2001/XMLSchema-instance" xmlns:pc="http://schemas.microsoft.com/office/infopath/2007/PartnerControls">
-  <documentManagement>
-    <Layouts xmlns="f20084d7-61e8-404e-beff-acc10ebb1c4c">C7,C5,C6,A2,T1,S1,S2,S3,S6,S7,C4,A3,S8,C8,C9,C10,C11,S9,S10,S11,S12</Layouts>
-    <Region xmlns="f20084d7-61e8-404e-beff-acc10ebb1c4c" xsi:nil="true"/>
-    <Key xmlns="f20084d7-61e8-404e-beff-acc10ebb1c4c">NEWPBCAPL</Key>
-    <TemplateSize xmlns="f20084d7-61e8-404e-beff-acc10ebb1c4c">Letter</TemplateSize>
-    <ItemsOrder xmlns="f20084d7-61e8-404e-beff-acc10ebb1c4c">10</ItemsOrder>
-    <Caption xmlns="f20084d7-61e8-404e-beff-acc10ebb1c4c">New PresBuilder Letter</Caption>
-    <Category xmlns="f20084d7-61e8-404e-beff-acc10ebb1c4c">Investment Banking</Category>
-    <TaxCatchAll xmlns="cdf71830-c9e3-49d3-97db-b43ec28a30d4" xsi:nil="true"/>
-    <lcf76f155ced4ddcb4097134ff3c332f xmlns="f20084d7-61e8-404e-beff-acc10ebb1c4c">
-      <Terms xmlns="http://schemas.microsoft.com/office/infopath/2007/PartnerControls"/>
-    </lcf76f155ced4ddcb4097134ff3c332f>
-  </documentManagement>
-</p:properties>
+<file path=customXml/itemProps1.xml><?xml version="1.0" encoding="utf-8"?>
+<ds:datastoreItem xmlns:ds="http://schemas.openxmlformats.org/officeDocument/2006/customXml" ds:itemID="{7DE6A9EC-70B2-4C9A-B73E-1A7E61FE92A5}">
+  <ds:schemaRefs>
+    <ds:schemaRef ds:uri="http://schemas.microsoft.com/office/infopath/2007/PartnerControls"/>
+    <ds:schemaRef ds:uri="fd6fbb7f-0d31-47a8-8a19-38b5c1e6bff0"/>
+    <ds:schemaRef ds:uri="http://schemas.microsoft.com/office/2006/metadata/properties"/>
+    <ds:schemaRef ds:uri="f20084d7-61e8-404e-beff-acc10ebb1c4c"/>
+    <ds:schemaRef ds:uri="http://purl.org/dc/terms/"/>
+    <ds:schemaRef ds:uri="http://www.w3.org/XML/1998/namespace"/>
+    <ds:schemaRef ds:uri="http://purl.org/dc/dcmitype/"/>
+    <ds:schemaRef ds:uri="cdf71830-c9e3-49d3-97db-b43ec28a30d4"/>
+    <ds:schemaRef ds:uri="http://schemas.microsoft.com/office/2006/documentManagement/types"/>
+    <ds:schemaRef ds:uri="http://schemas.openxmlformats.org/package/2006/metadata/core-properties"/>
+    <ds:schemaRef ds:uri="http://purl.org/dc/elements/1.1/"/>
+  </ds:schemaRefs>
+</ds:datastoreItem>
 </file>
 
-<file path=customXml/item3.xml><?xml version="1.0" encoding="utf-8"?>
-<?mso-contentType ?>
-<FormTemplates xmlns="http://schemas.microsoft.com/sharepoint/v3/contenttype/forms">
-  <Display>DocumentLibraryForm</Display>
-  <Edit>DocumentLibraryForm</Edit>
-  <New>DocumentLibraryForm</New>
-</FormTemplates>
+<file path=customXml/itemProps2.xml><?xml version="1.0" encoding="utf-8"?>
+<ds:datastoreItem xmlns:ds="http://schemas.openxmlformats.org/officeDocument/2006/customXml" ds:itemID="{5ECEEBF4-7E4F-423B-B7A7-297EF53B6B4D}">
+  <ds:schemaRefs>
+    <ds:schemaRef ds:uri="http://schemas.microsoft.com/sharepoint/v3/contenttype/forms"/>
+  </ds:schemaRefs>
+</ds:datastoreItem>
 </file>
 
-<file path=customXml/itemProps1.xml><?xml version="1.0" encoding="utf-8"?>
+<file path=customXml/itemProps3.xml><?xml version="1.0" encoding="utf-8"?>
 <ds:datastoreItem xmlns:ds="http://schemas.openxmlformats.org/officeDocument/2006/customXml" ds:itemID="{6AC94566-D1B0-429B-98E2-1570C8D4CAAA}">
   <ds:schemaRefs>
     <ds:schemaRef ds:uri="http://schemas.microsoft.com/office/2006/metadata/contentType"/>
@@ -46577,30 +46603,4 @@
     <ds:schemaRef ds:uri="http://schemas.microsoft.com/internal/obd"/>
   </ds:schemaRefs>
 </ds:datastoreItem>
-</file>
-
-<file path=customXml/itemProps2.xml><?xml version="1.0" encoding="utf-8"?>
-<ds:datastoreItem xmlns:ds="http://schemas.openxmlformats.org/officeDocument/2006/customXml" ds:itemID="{7DE6A9EC-70B2-4C9A-B73E-1A7E61FE92A5}">
-  <ds:schemaRefs>
-    <ds:schemaRef ds:uri="http://schemas.microsoft.com/office/infopath/2007/PartnerControls"/>
-    <ds:schemaRef ds:uri="fd6fbb7f-0d31-47a8-8a19-38b5c1e6bff0"/>
-    <ds:schemaRef ds:uri="http://schemas.microsoft.com/office/2006/metadata/properties"/>
-    <ds:schemaRef ds:uri="f20084d7-61e8-404e-beff-acc10ebb1c4c"/>
-    <ds:schemaRef ds:uri="http://purl.org/dc/terms/"/>
-    <ds:schemaRef ds:uri="http://www.w3.org/XML/1998/namespace"/>
-    <ds:schemaRef ds:uri="http://purl.org/dc/dcmitype/"/>
-    <ds:schemaRef ds:uri="cdf71830-c9e3-49d3-97db-b43ec28a30d4"/>
-    <ds:schemaRef ds:uri="http://schemas.microsoft.com/office/2006/documentManagement/types"/>
-    <ds:schemaRef ds:uri="http://schemas.openxmlformats.org/package/2006/metadata/core-properties"/>
-    <ds:schemaRef ds:uri="http://purl.org/dc/elements/1.1/"/>
-  </ds:schemaRefs>
-</ds:datastoreItem>
-</file>
-
-<file path=customXml/itemProps3.xml><?xml version="1.0" encoding="utf-8"?>
-<ds:datastoreItem xmlns:ds="http://schemas.openxmlformats.org/officeDocument/2006/customXml" ds:itemID="{5ECEEBF4-7E4F-423B-B7A7-297EF53B6B4D}">
-  <ds:schemaRefs>
-    <ds:schemaRef ds:uri="http://schemas.microsoft.com/sharepoint/v3/contenttype/forms"/>
-  </ds:schemaRefs>
-</ds:datastoreItem>
 </file>
</xml_diff>